<commit_message>
Last minute changes for Code PaLOUsa 2016
</commit_message>
<xml_diff>
--- a/Effectively Documenting your Development Project.pptx
+++ b/Effectively Documenting your Development Project.pptx
@@ -220,7 +220,7 @@
           <a:p>
             <a:fld id="{DE4C9721-1813-4A55-A5DA-76417DB5EE62}" type="datetimeFigureOut">
               <a:rPr lang="en-US" smtClean="0"/>
-              <a:t>3/28/16</a:t>
+              <a:t>3/30/16</a:t>
             </a:fld>
             <a:endParaRPr lang="en-US"/>
           </a:p>
@@ -802,7 +802,7 @@
           <a:p>
             <a:fld id="{1A6A9824-C09F-4166-9A2C-6C9FA577887A}" type="datetimeFigureOut">
               <a:rPr lang="en-US" smtClean="0"/>
-              <a:t>3/28/16</a:t>
+              <a:t>3/30/16</a:t>
             </a:fld>
             <a:endParaRPr lang="en-US"/>
           </a:p>
@@ -1012,7 +1012,7 @@
           <a:p>
             <a:fld id="{2A7CB402-B72D-3346-9EA5-354251120F9E}" type="datetimeFigureOut">
               <a:rPr lang="en-US" smtClean="0"/>
-              <a:t>3/28/16</a:t>
+              <a:t>3/30/16</a:t>
             </a:fld>
             <a:endParaRPr lang="en-US"/>
           </a:p>
@@ -1173,7 +1173,7 @@
           <a:p>
             <a:fld id="{2A7CB402-B72D-3346-9EA5-354251120F9E}" type="datetimeFigureOut">
               <a:rPr lang="en-US" smtClean="0"/>
-              <a:t>3/28/16</a:t>
+              <a:t>3/30/16</a:t>
             </a:fld>
             <a:endParaRPr lang="en-US"/>
           </a:p>
@@ -1396,7 +1396,7 @@
           <a:p>
             <a:fld id="{2A7CB402-B72D-3346-9EA5-354251120F9E}" type="datetimeFigureOut">
               <a:rPr lang="en-US" smtClean="0"/>
-              <a:t>3/28/16</a:t>
+              <a:t>3/30/16</a:t>
             </a:fld>
             <a:endParaRPr lang="en-US"/>
           </a:p>
@@ -1735,7 +1735,7 @@
           <a:p>
             <a:fld id="{2A7CB402-B72D-3346-9EA5-354251120F9E}" type="datetimeFigureOut">
               <a:rPr lang="en-US" smtClean="0"/>
-              <a:t>3/28/16</a:t>
+              <a:t>3/30/16</a:t>
             </a:fld>
             <a:endParaRPr lang="en-US"/>
           </a:p>
@@ -2113,7 +2113,7 @@
           <a:p>
             <a:fld id="{2A7CB402-B72D-3346-9EA5-354251120F9E}" type="datetimeFigureOut">
               <a:rPr lang="en-US" smtClean="0"/>
-              <a:t>3/28/16</a:t>
+              <a:t>3/30/16</a:t>
             </a:fld>
             <a:endParaRPr lang="en-US"/>
           </a:p>
@@ -2629,7 +2629,7 @@
           <a:p>
             <a:fld id="{2A7CB402-B72D-3346-9EA5-354251120F9E}" type="datetimeFigureOut">
               <a:rPr lang="en-US" smtClean="0"/>
-              <a:t>3/28/16</a:t>
+              <a:t>3/30/16</a:t>
             </a:fld>
             <a:endParaRPr lang="en-US"/>
           </a:p>
@@ -2797,7 +2797,7 @@
           <a:p>
             <a:fld id="{2A7CB402-B72D-3346-9EA5-354251120F9E}" type="datetimeFigureOut">
               <a:rPr lang="en-US" smtClean="0"/>
-              <a:t>3/28/16</a:t>
+              <a:t>3/30/16</a:t>
             </a:fld>
             <a:endParaRPr lang="en-US"/>
           </a:p>
@@ -2927,7 +2927,7 @@
           <a:p>
             <a:fld id="{2A7CB402-B72D-3346-9EA5-354251120F9E}" type="datetimeFigureOut">
               <a:rPr lang="en-US" smtClean="0"/>
-              <a:t>3/28/16</a:t>
+              <a:t>3/30/16</a:t>
             </a:fld>
             <a:endParaRPr lang="en-US"/>
           </a:p>
@@ -3275,7 +3275,7 @@
           <a:p>
             <a:fld id="{2A7CB402-B72D-3346-9EA5-354251120F9E}" type="datetimeFigureOut">
               <a:rPr lang="en-US" smtClean="0"/>
-              <a:t>3/28/16</a:t>
+              <a:t>3/30/16</a:t>
             </a:fld>
             <a:endParaRPr lang="en-US"/>
           </a:p>
@@ -3589,7 +3589,7 @@
           <a:p>
             <a:fld id="{2A7CB402-B72D-3346-9EA5-354251120F9E}" type="datetimeFigureOut">
               <a:rPr lang="en-US" smtClean="0"/>
-              <a:t>3/28/16</a:t>
+              <a:t>3/30/16</a:t>
             </a:fld>
             <a:endParaRPr lang="en-US"/>
           </a:p>
@@ -3813,7 +3813,7 @@
           <a:p>
             <a:fld id="{2A7CB402-B72D-3346-9EA5-354251120F9E}" type="datetimeFigureOut">
               <a:rPr lang="en-US" smtClean="0"/>
-              <a:t>3/28/16</a:t>
+              <a:t>3/30/16</a:t>
             </a:fld>
             <a:endParaRPr lang="en-US"/>
           </a:p>
@@ -4454,16 +4454,11 @@
               <a:rPr lang="en-US" dirty="0" smtClean="0"/>
               <a:t>Very important if the project deviates from commonly followed patterns</a:t>
             </a:r>
-            <a:endParaRPr lang="en-US" dirty="0" smtClean="0"/>
-          </a:p>
-          <a:p>
-            <a:r>
-              <a:rPr lang="en-US" dirty="0" smtClean="0"/>
-              <a:t>Include </a:t>
-            </a:r>
-            <a:r>
-              <a:rPr lang="en-US" dirty="0" smtClean="0"/>
-              <a:t>a </a:t>
+          </a:p>
+          <a:p>
+            <a:r>
+              <a:rPr lang="en-US" dirty="0" smtClean="0"/>
+              <a:t>Include a </a:t>
             </a:r>
             <a:r>
               <a:rPr lang="en-US" dirty="0"/>
@@ -4724,6 +4719,31 @@
               </a:rPr>
               <a:t>github.com/jkwuc89</a:t>
             </a:r>
+            <a:endParaRPr lang="en-US" dirty="0" smtClean="0"/>
+          </a:p>
+          <a:p>
+            <a:r>
+              <a:rPr lang="en-US" dirty="0"/>
+              <a:t>This presentation:</a:t>
+            </a:r>
+            <a:br>
+              <a:rPr lang="en-US" dirty="0"/>
+            </a:br>
+            <a:r>
+              <a:rPr lang="en-US" dirty="0">
+                <a:hlinkClick r:id="rId4"/>
+              </a:rPr>
+              <a:t>https://</a:t>
+            </a:r>
+            <a:r>
+              <a:rPr lang="en-US" dirty="0" smtClean="0">
+                <a:hlinkClick r:id="rId4"/>
+              </a:rPr>
+              <a:t>goo.gl/qfcm5X</a:t>
+            </a:r>
+            <a:endParaRPr lang="en-US" dirty="0" smtClean="0"/>
+          </a:p>
+          <a:p>
             <a:endParaRPr lang="en-US" dirty="0" smtClean="0"/>
           </a:p>
           <a:p>
@@ -5069,18 +5089,14 @@
             </a:r>
             <a:r>
               <a:rPr lang="en-US" dirty="0" smtClean="0"/>
-              <a:t>Processes </a:t>
-            </a:r>
-            <a:r>
-              <a:rPr lang="en-US" smtClean="0"/>
-              <a:t>is #</a:t>
-            </a:r>
-            <a:r>
-              <a:rPr lang="en-US"/>
+              <a:t>Processes is #</a:t>
+            </a:r>
+            <a:r>
+              <a:rPr lang="en-US" dirty="0"/>
               <a:t>4</a:t>
             </a:r>
             <a:r>
-              <a:rPr lang="en-US" smtClean="0"/>
+              <a:rPr lang="en-US" dirty="0" smtClean="0"/>
               <a:t> challenge</a:t>
             </a:r>
             <a:endParaRPr lang="en-US" dirty="0"/>
@@ -5192,8 +5208,23 @@
           <a:p>
             <a:r>
               <a:rPr lang="en-US" dirty="0" smtClean="0"/>
-              <a:t>Transition ongoing development and support to the client</a:t>
-            </a:r>
+              <a:t>Transition ongoing development and support to the </a:t>
+            </a:r>
+            <a:r>
+              <a:rPr lang="en-US" dirty="0" smtClean="0"/>
+              <a:t>client</a:t>
+            </a:r>
+          </a:p>
+          <a:p>
+            <a:r>
+              <a:rPr lang="en-US" dirty="0" smtClean="0"/>
+              <a:t>Documentation is part of your </a:t>
+            </a:r>
+            <a:r>
+              <a:rPr lang="en-US" smtClean="0"/>
+              <a:t>software deliverable</a:t>
+            </a:r>
+            <a:endParaRPr lang="en-US" dirty="0" smtClean="0"/>
           </a:p>
           <a:p>
             <a:endParaRPr lang="en-US" dirty="0" smtClean="0"/>
@@ -5387,11 +5418,7 @@
           <a:p>
             <a:r>
               <a:rPr lang="en-US" dirty="0" smtClean="0"/>
-              <a:t>Provide license request instructions as </a:t>
-            </a:r>
-            <a:r>
-              <a:rPr lang="en-US" dirty="0" smtClean="0"/>
-              <a:t>needed</a:t>
+              <a:t>Provide license request instructions as needed</a:t>
             </a:r>
           </a:p>
           <a:p>

</xml_diff>

<commit_message>
Merged document your development project presentations
</commit_message>
<xml_diff>
--- a/Effectively Documenting your Development Project.pptx
+++ b/Effectively Documenting your Development Project.pptx
@@ -5,7 +5,7 @@
     <p:sldMasterId id="2147483744" r:id="rId1"/>
   </p:sldMasterIdLst>
   <p:notesMasterIdLst>
-    <p:notesMasterId r:id="rId15"/>
+    <p:notesMasterId r:id="rId16"/>
   </p:notesMasterIdLst>
   <p:sldIdLst>
     <p:sldId id="315" r:id="rId2"/>
@@ -20,7 +20,8 @@
     <p:sldId id="312" r:id="rId11"/>
     <p:sldId id="313" r:id="rId12"/>
     <p:sldId id="314" r:id="rId13"/>
-    <p:sldId id="305" r:id="rId14"/>
+    <p:sldId id="317" r:id="rId14"/>
+    <p:sldId id="305" r:id="rId15"/>
   </p:sldIdLst>
   <p:sldSz cx="9144000" cy="6858000" type="screen4x3"/>
   <p:notesSz cx="6858000" cy="9144000"/>
@@ -220,7 +221,7 @@
           <a:p>
             <a:fld id="{DE4C9721-1813-4A55-A5DA-76417DB5EE62}" type="datetimeFigureOut">
               <a:rPr lang="en-US" smtClean="0"/>
-              <a:t>3/30/16</a:t>
+              <a:t>10/4/16</a:t>
             </a:fld>
             <a:endParaRPr lang="en-US"/>
           </a:p>
@@ -584,6 +585,223 @@
 </p:notes>
 </file>
 
+<file path=ppt/notesSlides/notesSlide2.xml><?xml version="1.0" encoding="utf-8"?>
+<p:notes xmlns:a="http://schemas.openxmlformats.org/drawingml/2006/main" xmlns:r="http://schemas.openxmlformats.org/officeDocument/2006/relationships" xmlns:p="http://schemas.openxmlformats.org/presentationml/2006/main">
+  <p:cSld>
+    <p:spTree>
+      <p:nvGrpSpPr>
+        <p:cNvPr id="1" name=""/>
+        <p:cNvGrpSpPr/>
+        <p:nvPr/>
+      </p:nvGrpSpPr>
+      <p:grpSpPr>
+        <a:xfrm>
+          <a:off x="0" y="0"/>
+          <a:ext cx="0" cy="0"/>
+          <a:chOff x="0" y="0"/>
+          <a:chExt cx="0" cy="0"/>
+        </a:xfrm>
+      </p:grpSpPr>
+      <p:sp>
+        <p:nvSpPr>
+          <p:cNvPr id="2" name="Slide Image Placeholder 1"/>
+          <p:cNvSpPr>
+            <a:spLocks noGrp="1" noRot="1" noChangeAspect="1"/>
+          </p:cNvSpPr>
+          <p:nvPr>
+            <p:ph type="sldImg"/>
+          </p:nvPr>
+        </p:nvSpPr>
+        <p:spPr/>
+      </p:sp>
+      <p:sp>
+        <p:nvSpPr>
+          <p:cNvPr id="3" name="Notes Placeholder 2"/>
+          <p:cNvSpPr>
+            <a:spLocks noGrp="1"/>
+          </p:cNvSpPr>
+          <p:nvPr>
+            <p:ph type="body" idx="1"/>
+          </p:nvPr>
+        </p:nvSpPr>
+        <p:spPr/>
+        <p:txBody>
+          <a:bodyPr/>
+          <a:lstStyle/>
+          <a:p>
+            <a:r>
+              <a:rPr lang="en-US" dirty="0" smtClean="0"/>
+              <a:t>Who are</a:t>
+            </a:r>
+            <a:r>
+              <a:rPr lang="en-US" baseline="0" dirty="0" smtClean="0"/>
+              <a:t> you?</a:t>
+            </a:r>
+          </a:p>
+          <a:p>
+            <a:pPr marL="171450" indent="-171450">
+              <a:buFont typeface="Arial" charset="0"/>
+              <a:buChar char="•"/>
+            </a:pPr>
+            <a:r>
+              <a:rPr lang="en-US" baseline="0" dirty="0" smtClean="0"/>
+              <a:t>Developers, Project managers, Business analysts</a:t>
+            </a:r>
+          </a:p>
+          <a:p>
+            <a:pPr marL="171450" indent="-171450">
+              <a:buFont typeface="Arial" charset="0"/>
+              <a:buChar char="•"/>
+            </a:pPr>
+            <a:r>
+              <a:rPr lang="en-US" baseline="0" dirty="0" smtClean="0"/>
+              <a:t>Java, .NET,  Web, Mobile</a:t>
+            </a:r>
+          </a:p>
+          <a:p>
+            <a:pPr marL="171450" indent="-171450">
+              <a:buFont typeface="Arial" charset="0"/>
+              <a:buChar char="•"/>
+            </a:pPr>
+            <a:r>
+              <a:rPr lang="en-US" baseline="0" dirty="0" smtClean="0"/>
+              <a:t>Current documentation level</a:t>
+            </a:r>
+            <a:endParaRPr lang="en-US" dirty="0" smtClean="0"/>
+          </a:p>
+          <a:p>
+            <a:endParaRPr lang="en-US" dirty="0"/>
+          </a:p>
+        </p:txBody>
+      </p:sp>
+      <p:sp>
+        <p:nvSpPr>
+          <p:cNvPr id="4" name="Slide Number Placeholder 3"/>
+          <p:cNvSpPr>
+            <a:spLocks noGrp="1"/>
+          </p:cNvSpPr>
+          <p:nvPr>
+            <p:ph type="sldNum" sz="quarter" idx="10"/>
+          </p:nvPr>
+        </p:nvSpPr>
+        <p:spPr/>
+        <p:txBody>
+          <a:bodyPr/>
+          <a:lstStyle/>
+          <a:p>
+            <a:fld id="{E5D4B8C3-E62F-4D90-96E6-3B107CCE0282}" type="slidenum">
+              <a:rPr lang="en-US" smtClean="0"/>
+              <a:t>3</a:t>
+            </a:fld>
+            <a:endParaRPr lang="en-US"/>
+          </a:p>
+        </p:txBody>
+      </p:sp>
+    </p:spTree>
+    <p:extLst>
+      <p:ext uri="{BB962C8B-B14F-4D97-AF65-F5344CB8AC3E}">
+        <p14:creationId xmlns:p14="http://schemas.microsoft.com/office/powerpoint/2010/main" val="106361166"/>
+      </p:ext>
+    </p:extLst>
+  </p:cSld>
+  <p:clrMapOvr>
+    <a:masterClrMapping/>
+  </p:clrMapOvr>
+</p:notes>
+</file>
+
+<file path=ppt/notesSlides/notesSlide3.xml><?xml version="1.0" encoding="utf-8"?>
+<p:notes xmlns:a="http://schemas.openxmlformats.org/drawingml/2006/main" xmlns:r="http://schemas.openxmlformats.org/officeDocument/2006/relationships" xmlns:p="http://schemas.openxmlformats.org/presentationml/2006/main">
+  <p:cSld>
+    <p:spTree>
+      <p:nvGrpSpPr>
+        <p:cNvPr id="1" name=""/>
+        <p:cNvGrpSpPr/>
+        <p:nvPr/>
+      </p:nvGrpSpPr>
+      <p:grpSpPr>
+        <a:xfrm>
+          <a:off x="0" y="0"/>
+          <a:ext cx="0" cy="0"/>
+          <a:chOff x="0" y="0"/>
+          <a:chExt cx="0" cy="0"/>
+        </a:xfrm>
+      </p:grpSpPr>
+      <p:sp>
+        <p:nvSpPr>
+          <p:cNvPr id="2" name="Slide Image Placeholder 1"/>
+          <p:cNvSpPr>
+            <a:spLocks noGrp="1" noRot="1" noChangeAspect="1"/>
+          </p:cNvSpPr>
+          <p:nvPr>
+            <p:ph type="sldImg"/>
+          </p:nvPr>
+        </p:nvSpPr>
+        <p:spPr/>
+      </p:sp>
+      <p:sp>
+        <p:nvSpPr>
+          <p:cNvPr id="3" name="Notes Placeholder 2"/>
+          <p:cNvSpPr>
+            <a:spLocks noGrp="1"/>
+          </p:cNvSpPr>
+          <p:nvPr>
+            <p:ph type="body" idx="1"/>
+          </p:nvPr>
+        </p:nvSpPr>
+        <p:spPr/>
+        <p:txBody>
+          <a:bodyPr/>
+          <a:lstStyle/>
+          <a:p>
+            <a:r>
+              <a:rPr lang="en-US" dirty="0" smtClean="0"/>
+              <a:t>Don't</a:t>
+            </a:r>
+            <a:r>
+              <a:rPr lang="en-US" baseline="0" dirty="0" smtClean="0"/>
+              <a:t> recommend using a tool based on hand coded mark up like Mark Down. Tool should allow the writer to focus on writing.</a:t>
+            </a:r>
+            <a:endParaRPr lang="en-US" dirty="0"/>
+          </a:p>
+        </p:txBody>
+      </p:sp>
+      <p:sp>
+        <p:nvSpPr>
+          <p:cNvPr id="4" name="Slide Number Placeholder 3"/>
+          <p:cNvSpPr>
+            <a:spLocks noGrp="1"/>
+          </p:cNvSpPr>
+          <p:nvPr>
+            <p:ph type="sldNum" sz="quarter" idx="10"/>
+          </p:nvPr>
+        </p:nvSpPr>
+        <p:spPr/>
+        <p:txBody>
+          <a:bodyPr/>
+          <a:lstStyle/>
+          <a:p>
+            <a:fld id="{E5D4B8C3-E62F-4D90-96E6-3B107CCE0282}" type="slidenum">
+              <a:rPr lang="en-US" smtClean="0"/>
+              <a:t>13</a:t>
+            </a:fld>
+            <a:endParaRPr lang="en-US"/>
+          </a:p>
+        </p:txBody>
+      </p:sp>
+    </p:spTree>
+    <p:extLst>
+      <p:ext uri="{BB962C8B-B14F-4D97-AF65-F5344CB8AC3E}">
+        <p14:creationId xmlns:p14="http://schemas.microsoft.com/office/powerpoint/2010/main" val="688318146"/>
+      </p:ext>
+    </p:extLst>
+  </p:cSld>
+  <p:clrMapOvr>
+    <a:masterClrMapping/>
+  </p:clrMapOvr>
+</p:notes>
+</file>
+
 <file path=ppt/slideLayouts/slideLayout1.xml><?xml version="1.0" encoding="utf-8"?>
 <p:sldLayout xmlns:a="http://schemas.openxmlformats.org/drawingml/2006/main" xmlns:r="http://schemas.openxmlformats.org/officeDocument/2006/relationships" xmlns:p="http://schemas.openxmlformats.org/presentationml/2006/main" type="title" preserve="1">
   <p:cSld name="Title Slide">
@@ -802,7 +1020,7 @@
           <a:p>
             <a:fld id="{1A6A9824-C09F-4166-9A2C-6C9FA577887A}" type="datetimeFigureOut">
               <a:rPr lang="en-US" smtClean="0"/>
-              <a:t>3/30/16</a:t>
+              <a:t>10/4/16</a:t>
             </a:fld>
             <a:endParaRPr lang="en-US"/>
           </a:p>
@@ -1012,7 +1230,7 @@
           <a:p>
             <a:fld id="{2A7CB402-B72D-3346-9EA5-354251120F9E}" type="datetimeFigureOut">
               <a:rPr lang="en-US" smtClean="0"/>
-              <a:t>3/30/16</a:t>
+              <a:t>10/4/16</a:t>
             </a:fld>
             <a:endParaRPr lang="en-US"/>
           </a:p>
@@ -1173,7 +1391,7 @@
           <a:p>
             <a:fld id="{2A7CB402-B72D-3346-9EA5-354251120F9E}" type="datetimeFigureOut">
               <a:rPr lang="en-US" smtClean="0"/>
-              <a:t>3/30/16</a:t>
+              <a:t>10/4/16</a:t>
             </a:fld>
             <a:endParaRPr lang="en-US"/>
           </a:p>
@@ -1396,7 +1614,7 @@
           <a:p>
             <a:fld id="{2A7CB402-B72D-3346-9EA5-354251120F9E}" type="datetimeFigureOut">
               <a:rPr lang="en-US" smtClean="0"/>
-              <a:t>3/30/16</a:t>
+              <a:t>10/4/16</a:t>
             </a:fld>
             <a:endParaRPr lang="en-US"/>
           </a:p>
@@ -1735,7 +1953,7 @@
           <a:p>
             <a:fld id="{2A7CB402-B72D-3346-9EA5-354251120F9E}" type="datetimeFigureOut">
               <a:rPr lang="en-US" smtClean="0"/>
-              <a:t>3/30/16</a:t>
+              <a:t>10/4/16</a:t>
             </a:fld>
             <a:endParaRPr lang="en-US"/>
           </a:p>
@@ -2113,7 +2331,7 @@
           <a:p>
             <a:fld id="{2A7CB402-B72D-3346-9EA5-354251120F9E}" type="datetimeFigureOut">
               <a:rPr lang="en-US" smtClean="0"/>
-              <a:t>3/30/16</a:t>
+              <a:t>10/4/16</a:t>
             </a:fld>
             <a:endParaRPr lang="en-US"/>
           </a:p>
@@ -2629,7 +2847,7 @@
           <a:p>
             <a:fld id="{2A7CB402-B72D-3346-9EA5-354251120F9E}" type="datetimeFigureOut">
               <a:rPr lang="en-US" smtClean="0"/>
-              <a:t>3/30/16</a:t>
+              <a:t>10/4/16</a:t>
             </a:fld>
             <a:endParaRPr lang="en-US"/>
           </a:p>
@@ -2797,7 +3015,7 @@
           <a:p>
             <a:fld id="{2A7CB402-B72D-3346-9EA5-354251120F9E}" type="datetimeFigureOut">
               <a:rPr lang="en-US" smtClean="0"/>
-              <a:t>3/30/16</a:t>
+              <a:t>10/4/16</a:t>
             </a:fld>
             <a:endParaRPr lang="en-US"/>
           </a:p>
@@ -2927,7 +3145,7 @@
           <a:p>
             <a:fld id="{2A7CB402-B72D-3346-9EA5-354251120F9E}" type="datetimeFigureOut">
               <a:rPr lang="en-US" smtClean="0"/>
-              <a:t>3/30/16</a:t>
+              <a:t>10/4/16</a:t>
             </a:fld>
             <a:endParaRPr lang="en-US"/>
           </a:p>
@@ -3275,7 +3493,7 @@
           <a:p>
             <a:fld id="{2A7CB402-B72D-3346-9EA5-354251120F9E}" type="datetimeFigureOut">
               <a:rPr lang="en-US" smtClean="0"/>
-              <a:t>3/30/16</a:t>
+              <a:t>10/4/16</a:t>
             </a:fld>
             <a:endParaRPr lang="en-US"/>
           </a:p>
@@ -3589,7 +3807,7 @@
           <a:p>
             <a:fld id="{2A7CB402-B72D-3346-9EA5-354251120F9E}" type="datetimeFigureOut">
               <a:rPr lang="en-US" smtClean="0"/>
-              <a:t>3/30/16</a:t>
+              <a:t>10/4/16</a:t>
             </a:fld>
             <a:endParaRPr lang="en-US"/>
           </a:p>
@@ -3813,7 +4031,7 @@
           <a:p>
             <a:fld id="{2A7CB402-B72D-3346-9EA5-354251120F9E}" type="datetimeFigureOut">
               <a:rPr lang="en-US" smtClean="0"/>
-              <a:t>3/30/16</a:t>
+              <a:t>10/4/16</a:t>
             </a:fld>
             <a:endParaRPr lang="en-US"/>
           </a:p>
@@ -4474,15 +4692,13 @@
             </a:r>
             <a:r>
               <a:rPr lang="en-US" dirty="0" smtClean="0"/>
-              <a:t>encountered problems.</a:t>
-            </a:r>
-          </a:p>
-          <a:p>
-            <a:r>
-              <a:rPr lang="en-US" dirty="0" smtClean="0"/>
-              <a:t>Let’s walk through a real sample</a:t>
-            </a:r>
-            <a:endParaRPr lang="en-US" dirty="0"/>
+              <a:t>encountered </a:t>
+            </a:r>
+            <a:r>
+              <a:rPr lang="en-US" dirty="0" smtClean="0"/>
+              <a:t>problems</a:t>
+            </a:r>
+            <a:endParaRPr lang="en-US" dirty="0" smtClean="0"/>
           </a:p>
         </p:txBody>
       </p:sp>
@@ -4557,29 +4773,44 @@
           <a:lstStyle/>
           <a:p>
             <a:r>
-              <a:rPr lang="en-US" dirty="0" smtClean="0"/>
+              <a:rPr lang="en-US" dirty="0"/>
               <a:t>Project architect writes it</a:t>
             </a:r>
           </a:p>
           <a:p>
             <a:r>
-              <a:rPr lang="en-US" dirty="0" smtClean="0"/>
-              <a:t>Entire development team keeps it up to date</a:t>
-            </a:r>
-          </a:p>
-          <a:p>
-            <a:r>
-              <a:rPr lang="en-US" dirty="0" smtClean="0"/>
+              <a:rPr lang="en-US" dirty="0"/>
+              <a:t>Entire development team owns it</a:t>
+            </a:r>
+          </a:p>
+          <a:p>
+            <a:pPr lvl="1"/>
+            <a:r>
+              <a:rPr lang="en-US" dirty="0"/>
+              <a:t>Recurring task in each sprint to update it</a:t>
+            </a:r>
+          </a:p>
+          <a:p>
+            <a:r>
+              <a:rPr lang="en-US" dirty="0"/>
               <a:t>Do not put this off until later</a:t>
             </a:r>
           </a:p>
           <a:p>
             <a:r>
-              <a:rPr lang="en-US" dirty="0" smtClean="0"/>
-              <a:t>TEST IT!</a:t>
-            </a:r>
-          </a:p>
-          <a:p>
+              <a:rPr lang="en-US" dirty="0"/>
+              <a:t>Don't ignore it once it's written</a:t>
+            </a:r>
+          </a:p>
+          <a:p>
+            <a:r>
+              <a:rPr lang="en-US" dirty="0"/>
+              <a:t>TEST IT</a:t>
+            </a:r>
+            <a:r>
+              <a:rPr lang="en-US" dirty="0" smtClean="0"/>
+              <a:t>!</a:t>
+            </a:r>
             <a:endParaRPr lang="en-US" dirty="0"/>
           </a:p>
         </p:txBody>
@@ -4633,6 +4864,152 @@
           <a:p>
             <a:r>
               <a:rPr lang="en-US" dirty="0" smtClean="0"/>
+              <a:t>How do you write it?</a:t>
+            </a:r>
+            <a:endParaRPr lang="en-US" dirty="0"/>
+          </a:p>
+        </p:txBody>
+      </p:sp>
+      <p:sp>
+        <p:nvSpPr>
+          <p:cNvPr id="3" name="Content Placeholder 2"/>
+          <p:cNvSpPr>
+            <a:spLocks noGrp="1"/>
+          </p:cNvSpPr>
+          <p:nvPr>
+            <p:ph idx="1"/>
+          </p:nvPr>
+        </p:nvSpPr>
+        <p:spPr/>
+        <p:txBody>
+          <a:bodyPr/>
+          <a:lstStyle/>
+          <a:p>
+            <a:r>
+              <a:rPr lang="en-US" dirty="0" smtClean="0"/>
+              <a:t>Keep it simple and straightforward</a:t>
+            </a:r>
+          </a:p>
+          <a:p>
+            <a:r>
+              <a:rPr lang="en-US" dirty="0" smtClean="0"/>
+              <a:t>Know and target your audience</a:t>
+            </a:r>
+          </a:p>
+          <a:p>
+            <a:r>
+              <a:rPr lang="en-US" dirty="0" smtClean="0"/>
+              <a:t>Treat it as a project deliverable</a:t>
+            </a:r>
+          </a:p>
+          <a:p>
+            <a:pPr lvl="1"/>
+            <a:r>
+              <a:rPr lang="en-US" dirty="0" smtClean="0"/>
+              <a:t>Version </a:t>
+            </a:r>
+            <a:r>
+              <a:rPr lang="en-US" dirty="0" smtClean="0"/>
+              <a:t>controlled</a:t>
+            </a:r>
+          </a:p>
+          <a:p>
+            <a:r>
+              <a:rPr lang="en-US" dirty="0" smtClean="0"/>
+              <a:t>DRY </a:t>
+            </a:r>
+            <a:r>
+              <a:rPr lang="mr-IN" dirty="0" smtClean="0"/>
+              <a:t>–</a:t>
+            </a:r>
+            <a:r>
+              <a:rPr lang="en-US" dirty="0" smtClean="0"/>
+              <a:t> Don't repeat yourself</a:t>
+            </a:r>
+            <a:endParaRPr lang="en-US" dirty="0" smtClean="0"/>
+          </a:p>
+          <a:p>
+            <a:r>
+              <a:rPr lang="en-US" dirty="0" smtClean="0"/>
+              <a:t>Suggested tools</a:t>
+            </a:r>
+          </a:p>
+          <a:p>
+            <a:pPr lvl="1"/>
+            <a:r>
+              <a:rPr lang="en-US" dirty="0" smtClean="0"/>
+              <a:t>Microsoft Office</a:t>
+            </a:r>
+          </a:p>
+          <a:p>
+            <a:pPr lvl="1"/>
+            <a:r>
+              <a:rPr lang="en-US" dirty="0" err="1" smtClean="0"/>
+              <a:t>Atlassian</a:t>
+            </a:r>
+            <a:r>
+              <a:rPr lang="en-US" dirty="0" smtClean="0"/>
+              <a:t> Confluence</a:t>
+            </a:r>
+          </a:p>
+        </p:txBody>
+      </p:sp>
+    </p:spTree>
+    <p:extLst>
+      <p:ext uri="{BB962C8B-B14F-4D97-AF65-F5344CB8AC3E}">
+        <p14:creationId xmlns:p14="http://schemas.microsoft.com/office/powerpoint/2010/main" val="1453716295"/>
+      </p:ext>
+    </p:extLst>
+  </p:cSld>
+  <p:clrMapOvr>
+    <a:masterClrMapping/>
+  </p:clrMapOvr>
+  <p:timing>
+    <p:tnLst>
+      <p:par>
+        <p:cTn id="1" dur="indefinite" restart="never" nodeType="tmRoot"/>
+      </p:par>
+    </p:tnLst>
+  </p:timing>
+</p:sld>
+</file>
+
+<file path=ppt/slides/slide14.xml><?xml version="1.0" encoding="utf-8"?>
+<p:sld xmlns:a="http://schemas.openxmlformats.org/drawingml/2006/main" xmlns:r="http://schemas.openxmlformats.org/officeDocument/2006/relationships" xmlns:p="http://schemas.openxmlformats.org/presentationml/2006/main">
+  <p:cSld>
+    <p:spTree>
+      <p:nvGrpSpPr>
+        <p:cNvPr id="1" name=""/>
+        <p:cNvGrpSpPr/>
+        <p:nvPr/>
+      </p:nvGrpSpPr>
+      <p:grpSpPr>
+        <a:xfrm>
+          <a:off x="0" y="0"/>
+          <a:ext cx="0" cy="0"/>
+          <a:chOff x="0" y="0"/>
+          <a:chExt cx="0" cy="0"/>
+        </a:xfrm>
+      </p:grpSpPr>
+      <p:sp>
+        <p:nvSpPr>
+          <p:cNvPr id="2" name="Title 1"/>
+          <p:cNvSpPr>
+            <a:spLocks noGrp="1"/>
+          </p:cNvSpPr>
+          <p:nvPr>
+            <p:ph type="title"/>
+          </p:nvPr>
+        </p:nvSpPr>
+        <p:spPr/>
+        <p:txBody>
+          <a:bodyPr>
+            <a:normAutofit fontScale="90000"/>
+          </a:bodyPr>
+          <a:lstStyle/>
+          <a:p>
+            <a:r>
+              <a:rPr lang="en-US" dirty="0" smtClean="0"/>
               <a:t>Questions</a:t>
             </a:r>
             <a:endParaRPr lang="en-US" dirty="0"/>
@@ -4818,7 +5195,9 @@
         </p:nvSpPr>
         <p:spPr/>
         <p:txBody>
-          <a:bodyPr/>
+          <a:bodyPr>
+            <a:normAutofit lnSpcReduction="10000"/>
+          </a:bodyPr>
           <a:lstStyle/>
           <a:p>
             <a:r>
@@ -4853,8 +5232,23 @@
           <a:p>
             <a:r>
               <a:rPr lang="en-US" dirty="0" smtClean="0"/>
-              <a:t>Who writes and maintains this?</a:t>
-            </a:r>
+              <a:t>Who writes and maintains this</a:t>
+            </a:r>
+            <a:r>
+              <a:rPr lang="en-US" dirty="0" smtClean="0"/>
+              <a:t>?</a:t>
+            </a:r>
+          </a:p>
+          <a:p>
+            <a:r>
+              <a:rPr lang="en-US" dirty="0"/>
+              <a:t>How do you write it</a:t>
+            </a:r>
+            <a:r>
+              <a:rPr lang="en-US" dirty="0" smtClean="0"/>
+              <a:t>?</a:t>
+            </a:r>
+            <a:endParaRPr lang="en-US" dirty="0" smtClean="0"/>
           </a:p>
           <a:p>
             <a:r>
@@ -4970,8 +5364,23 @@
           <a:p>
             <a:r>
               <a:rPr lang="en-US" dirty="0" smtClean="0"/>
-              <a:t>Currently working at a client where there is little documentation</a:t>
-            </a:r>
+              <a:t>Currently working at a client where there is little </a:t>
+            </a:r>
+            <a:r>
+              <a:rPr lang="en-US" dirty="0" smtClean="0"/>
+              <a:t>documentation</a:t>
+            </a:r>
+          </a:p>
+          <a:p>
+            <a:r>
+              <a:rPr lang="en-US" dirty="0"/>
+              <a:t>Who are you</a:t>
+            </a:r>
+            <a:r>
+              <a:rPr lang="en-US" dirty="0" smtClean="0"/>
+              <a:t>?</a:t>
+            </a:r>
+            <a:endParaRPr lang="en-US" dirty="0"/>
           </a:p>
         </p:txBody>
       </p:sp>
@@ -5208,23 +5617,18 @@
           <a:p>
             <a:r>
               <a:rPr lang="en-US" dirty="0" smtClean="0"/>
-              <a:t>Transition ongoing development and support to the </a:t>
-            </a:r>
-            <a:r>
-              <a:rPr lang="en-US" dirty="0" smtClean="0"/>
-              <a:t>client</a:t>
-            </a:r>
-          </a:p>
-          <a:p>
-            <a:r>
-              <a:rPr lang="en-US" dirty="0" smtClean="0"/>
-              <a:t>Documentation is part of your </a:t>
-            </a:r>
-            <a:r>
-              <a:rPr lang="en-US" smtClean="0"/>
-              <a:t>software deliverable</a:t>
-            </a:r>
-            <a:endParaRPr lang="en-US" dirty="0" smtClean="0"/>
+              <a:t>Transition ongoing development and support to the client</a:t>
+            </a:r>
+          </a:p>
+          <a:p>
+            <a:r>
+              <a:rPr lang="en-US" dirty="0" smtClean="0"/>
+              <a:t>Treat documentation </a:t>
+            </a:r>
+            <a:r>
+              <a:rPr lang="en-US" dirty="0" smtClean="0"/>
+              <a:t>is part of your software deliverable</a:t>
+            </a:r>
           </a:p>
           <a:p>
             <a:endParaRPr lang="en-US" dirty="0" smtClean="0"/>
@@ -5501,7 +5905,7 @@
         <p:spPr/>
         <p:txBody>
           <a:bodyPr>
-            <a:normAutofit/>
+            <a:normAutofit lnSpcReduction="10000"/>
           </a:bodyPr>
           <a:lstStyle/>
           <a:p>
@@ -5514,8 +5918,13 @@
             <a:pPr lvl="1"/>
             <a:r>
               <a:rPr lang="en-US" dirty="0" smtClean="0"/>
-              <a:t>Include project owner/sponsor, PMs, BAs, developers, QA</a:t>
-            </a:r>
+              <a:t>Include project owner/sponsor, PMs, BAs, developers, </a:t>
+            </a:r>
+            <a:r>
+              <a:rPr lang="en-US" dirty="0" smtClean="0"/>
+              <a:t>QA, IT support</a:t>
+            </a:r>
+            <a:endParaRPr lang="en-US" dirty="0" smtClean="0"/>
           </a:p>
           <a:p>
             <a:pPr lvl="1"/>
@@ -5527,8 +5936,23 @@
           <a:p>
             <a:r>
               <a:rPr lang="en-US" dirty="0" smtClean="0"/>
-              <a:t>Links to project requirements</a:t>
-            </a:r>
+              <a:t>Links to project </a:t>
+            </a:r>
+            <a:r>
+              <a:rPr lang="en-US" dirty="0" smtClean="0"/>
+              <a:t>requirements</a:t>
+            </a:r>
+          </a:p>
+          <a:p>
+            <a:r>
+              <a:rPr lang="en-US" dirty="0"/>
+              <a:t>Links to architecture and design </a:t>
+            </a:r>
+            <a:r>
+              <a:rPr lang="en-US" dirty="0" smtClean="0"/>
+              <a:t>docs</a:t>
+            </a:r>
+            <a:endParaRPr lang="en-US" dirty="0" smtClean="0"/>
           </a:p>
           <a:p>
             <a:r>
@@ -5773,9 +6197,26 @@
           <a:p>
             <a:pPr lvl="1"/>
             <a:r>
-              <a:rPr lang="en-US" dirty="0" smtClean="0"/>
-              <a:t>Ant, Maven, Gradle, proprietary?</a:t>
-            </a:r>
+              <a:rPr lang="en-US" dirty="0"/>
+              <a:t>Ant, Maven, Gradle, </a:t>
+            </a:r>
+            <a:r>
+              <a:rPr lang="en-US" dirty="0" err="1"/>
+              <a:t>MSBuild</a:t>
+            </a:r>
+            <a:r>
+              <a:rPr lang="en-US" dirty="0"/>
+              <a:t>, </a:t>
+            </a:r>
+            <a:r>
+              <a:rPr lang="en-US" dirty="0" smtClean="0"/>
+              <a:t>Grunt, Gulp, internally developed/proprietary</a:t>
+            </a:r>
+            <a:r>
+              <a:rPr lang="en-US" dirty="0"/>
+              <a:t>?</a:t>
+            </a:r>
+            <a:endParaRPr lang="en-US" dirty="0" smtClean="0"/>
           </a:p>
           <a:p>
             <a:r>

</xml_diff>

<commit_message>
Last minor DogFoodCon 2016 update
</commit_message>
<xml_diff>
--- a/Effectively Documenting your Development Project.pptx
+++ b/Effectively Documenting your Development Project.pptx
@@ -4560,6 +4560,13 @@
   <p:clrMapOvr>
     <a:masterClrMapping/>
   </p:clrMapOvr>
+  <p:timing>
+    <p:tnLst>
+      <p:par>
+        <p:cTn id="1" dur="indefinite" restart="never" nodeType="tmRoot"/>
+      </p:par>
+    </p:tnLst>
+  </p:timing>
 </p:sld>
 </file>
 
@@ -4686,6 +4693,13 @@
   <p:clrMapOvr>
     <a:masterClrMapping/>
   </p:clrMapOvr>
+  <p:timing>
+    <p:tnLst>
+      <p:par>
+        <p:cTn id="1" dur="indefinite" restart="never" nodeType="tmRoot"/>
+      </p:par>
+    </p:tnLst>
+  </p:timing>
 </p:sld>
 </file>
 
@@ -4799,6 +4813,13 @@
   <p:clrMapOvr>
     <a:masterClrMapping/>
   </p:clrMapOvr>
+  <p:timing>
+    <p:tnLst>
+      <p:par>
+        <p:cTn id="1" dur="indefinite" restart="never" nodeType="tmRoot"/>
+      </p:par>
+    </p:tnLst>
+  </p:timing>
 </p:sld>
 </file>
 
@@ -4916,6 +4937,13 @@
   <p:clrMapOvr>
     <a:masterClrMapping/>
   </p:clrMapOvr>
+  <p:timing>
+    <p:tnLst>
+      <p:par>
+        <p:cTn id="1" dur="indefinite" restart="never" nodeType="tmRoot"/>
+      </p:par>
+    </p:tnLst>
+  </p:timing>
 </p:sld>
 </file>
 
@@ -5262,6 +5290,13 @@
   <p:clrMapOvr>
     <a:masterClrMapping/>
   </p:clrMapOvr>
+  <p:timing>
+    <p:tnLst>
+      <p:par>
+        <p:cTn id="1" dur="indefinite" restart="never" nodeType="tmRoot"/>
+      </p:par>
+    </p:tnLst>
+  </p:timing>
 </p:sld>
 </file>
 
@@ -5522,6 +5557,13 @@
   <p:clrMapOvr>
     <a:masterClrMapping/>
   </p:clrMapOvr>
+  <p:timing>
+    <p:tnLst>
+      <p:par>
+        <p:cTn id="1" dur="indefinite" restart="never" nodeType="tmRoot"/>
+      </p:par>
+    </p:tnLst>
+  </p:timing>
 </p:sld>
 </file>
 
@@ -5663,6 +5705,13 @@
   <p:clrMapOvr>
     <a:masterClrMapping/>
   </p:clrMapOvr>
+  <p:timing>
+    <p:tnLst>
+      <p:par>
+        <p:cTn id="1" dur="indefinite" restart="never" nodeType="tmRoot"/>
+      </p:par>
+    </p:tnLst>
+  </p:timing>
 </p:sld>
 </file>
 
@@ -5745,8 +5794,17 @@
           <a:p>
             <a:r>
               <a:rPr lang="en-US" dirty="0" smtClean="0"/>
-              <a:t>Transition ongoing development and support to the client</a:t>
-            </a:r>
+              <a:t>Transition ongoing development and support to the </a:t>
+            </a:r>
+            <a:r>
+              <a:rPr lang="en-US" dirty="0" smtClean="0"/>
+              <a:t>client or to your </a:t>
+            </a:r>
+            <a:r>
+              <a:rPr lang="en-US" smtClean="0"/>
+              <a:t>support organization</a:t>
+            </a:r>
+            <a:endParaRPr lang="en-US" dirty="0" smtClean="0"/>
           </a:p>
           <a:p>
             <a:r>
@@ -5773,6 +5831,13 @@
   <p:clrMapOvr>
     <a:masterClrMapping/>
   </p:clrMapOvr>
+  <p:timing>
+    <p:tnLst>
+      <p:par>
+        <p:cTn id="1" dur="indefinite" restart="never" nodeType="tmRoot"/>
+      </p:par>
+    </p:tnLst>
+  </p:timing>
 </p:sld>
 </file>
 
@@ -5983,6 +6048,13 @@
   <p:clrMapOvr>
     <a:masterClrMapping/>
   </p:clrMapOvr>
+  <p:timing>
+    <p:tnLst>
+      <p:par>
+        <p:cTn id="1" dur="indefinite" restart="never" nodeType="tmRoot"/>
+      </p:par>
+    </p:tnLst>
+  </p:timing>
 </p:sld>
 </file>
 
@@ -6098,6 +6170,13 @@
   <p:clrMapOvr>
     <a:masterClrMapping/>
   </p:clrMapOvr>
+  <p:timing>
+    <p:tnLst>
+      <p:par>
+        <p:cTn id="1" dur="indefinite" restart="never" nodeType="tmRoot"/>
+      </p:par>
+    </p:tnLst>
+  </p:timing>
 </p:sld>
 </file>
 
@@ -6245,6 +6324,13 @@
   <p:clrMapOvr>
     <a:masterClrMapping/>
   </p:clrMapOvr>
+  <p:timing>
+    <p:tnLst>
+      <p:par>
+        <p:cTn id="1" dur="indefinite" restart="never" nodeType="tmRoot"/>
+      </p:par>
+    </p:tnLst>
+  </p:timing>
 </p:sld>
 </file>
 
@@ -6400,6 +6486,13 @@
   <p:clrMapOvr>
     <a:masterClrMapping/>
   </p:clrMapOvr>
+  <p:timing>
+    <p:tnLst>
+      <p:par>
+        <p:cTn id="1" dur="indefinite" restart="never" nodeType="tmRoot"/>
+      </p:par>
+    </p:tnLst>
+  </p:timing>
 </p:sld>
 </file>
 

</xml_diff>

<commit_message>
Updates for Agile Lunchbox presentation
</commit_message>
<xml_diff>
--- a/Effectively Documenting your Development Project.pptx
+++ b/Effectively Documenting your Development Project.pptx
@@ -5,7 +5,7 @@
     <p:sldMasterId id="2147483744" r:id="rId1"/>
   </p:sldMasterIdLst>
   <p:notesMasterIdLst>
-    <p:notesMasterId r:id="rId16"/>
+    <p:notesMasterId r:id="rId17"/>
   </p:notesMasterIdLst>
   <p:sldIdLst>
     <p:sldId id="315" r:id="rId2"/>
@@ -21,7 +21,8 @@
     <p:sldId id="313" r:id="rId12"/>
     <p:sldId id="314" r:id="rId13"/>
     <p:sldId id="317" r:id="rId14"/>
-    <p:sldId id="305" r:id="rId15"/>
+    <p:sldId id="318" r:id="rId15"/>
+    <p:sldId id="305" r:id="rId16"/>
   </p:sldIdLst>
   <p:sldSz cx="9144000" cy="6858000" type="screen4x3"/>
   <p:notesSz cx="6858000" cy="9144000"/>
@@ -221,7 +222,7 @@
           <a:p>
             <a:fld id="{DE4C9721-1813-4A55-A5DA-76417DB5EE62}" type="datetimeFigureOut">
               <a:rPr lang="en-US" smtClean="0"/>
-              <a:t>10/5/16</a:t>
+              <a:t>3/8/17</a:t>
             </a:fld>
             <a:endParaRPr lang="en-US"/>
           </a:p>
@@ -1112,7 +1113,7 @@
           <a:p>
             <a:fld id="{1A6A9824-C09F-4166-9A2C-6C9FA577887A}" type="datetimeFigureOut">
               <a:rPr lang="en-US" smtClean="0"/>
-              <a:t>10/5/16</a:t>
+              <a:t>3/8/17</a:t>
             </a:fld>
             <a:endParaRPr lang="en-US"/>
           </a:p>
@@ -1322,7 +1323,7 @@
           <a:p>
             <a:fld id="{2A7CB402-B72D-3346-9EA5-354251120F9E}" type="datetimeFigureOut">
               <a:rPr lang="en-US" smtClean="0"/>
-              <a:t>10/5/16</a:t>
+              <a:t>3/8/17</a:t>
             </a:fld>
             <a:endParaRPr lang="en-US"/>
           </a:p>
@@ -1483,7 +1484,7 @@
           <a:p>
             <a:fld id="{2A7CB402-B72D-3346-9EA5-354251120F9E}" type="datetimeFigureOut">
               <a:rPr lang="en-US" smtClean="0"/>
-              <a:t>10/5/16</a:t>
+              <a:t>3/8/17</a:t>
             </a:fld>
             <a:endParaRPr lang="en-US"/>
           </a:p>
@@ -1706,7 +1707,7 @@
           <a:p>
             <a:fld id="{2A7CB402-B72D-3346-9EA5-354251120F9E}" type="datetimeFigureOut">
               <a:rPr lang="en-US" smtClean="0"/>
-              <a:t>10/5/16</a:t>
+              <a:t>3/8/17</a:t>
             </a:fld>
             <a:endParaRPr lang="en-US"/>
           </a:p>
@@ -2045,7 +2046,7 @@
           <a:p>
             <a:fld id="{2A7CB402-B72D-3346-9EA5-354251120F9E}" type="datetimeFigureOut">
               <a:rPr lang="en-US" smtClean="0"/>
-              <a:t>10/5/16</a:t>
+              <a:t>3/8/17</a:t>
             </a:fld>
             <a:endParaRPr lang="en-US"/>
           </a:p>
@@ -2423,7 +2424,7 @@
           <a:p>
             <a:fld id="{2A7CB402-B72D-3346-9EA5-354251120F9E}" type="datetimeFigureOut">
               <a:rPr lang="en-US" smtClean="0"/>
-              <a:t>10/5/16</a:t>
+              <a:t>3/8/17</a:t>
             </a:fld>
             <a:endParaRPr lang="en-US"/>
           </a:p>
@@ -2939,7 +2940,7 @@
           <a:p>
             <a:fld id="{2A7CB402-B72D-3346-9EA5-354251120F9E}" type="datetimeFigureOut">
               <a:rPr lang="en-US" smtClean="0"/>
-              <a:t>10/5/16</a:t>
+              <a:t>3/8/17</a:t>
             </a:fld>
             <a:endParaRPr lang="en-US"/>
           </a:p>
@@ -3107,7 +3108,7 @@
           <a:p>
             <a:fld id="{2A7CB402-B72D-3346-9EA5-354251120F9E}" type="datetimeFigureOut">
               <a:rPr lang="en-US" smtClean="0"/>
-              <a:t>10/5/16</a:t>
+              <a:t>3/8/17</a:t>
             </a:fld>
             <a:endParaRPr lang="en-US"/>
           </a:p>
@@ -3237,7 +3238,7 @@
           <a:p>
             <a:fld id="{2A7CB402-B72D-3346-9EA5-354251120F9E}" type="datetimeFigureOut">
               <a:rPr lang="en-US" smtClean="0"/>
-              <a:t>10/5/16</a:t>
+              <a:t>3/8/17</a:t>
             </a:fld>
             <a:endParaRPr lang="en-US"/>
           </a:p>
@@ -3585,7 +3586,7 @@
           <a:p>
             <a:fld id="{2A7CB402-B72D-3346-9EA5-354251120F9E}" type="datetimeFigureOut">
               <a:rPr lang="en-US" smtClean="0"/>
-              <a:t>10/5/16</a:t>
+              <a:t>3/8/17</a:t>
             </a:fld>
             <a:endParaRPr lang="en-US"/>
           </a:p>
@@ -3899,7 +3900,7 @@
           <a:p>
             <a:fld id="{2A7CB402-B72D-3346-9EA5-354251120F9E}" type="datetimeFigureOut">
               <a:rPr lang="en-US" smtClean="0"/>
-              <a:t>10/5/16</a:t>
+              <a:t>3/8/17</a:t>
             </a:fld>
             <a:endParaRPr lang="en-US"/>
           </a:p>
@@ -4123,7 +4124,7 @@
           <a:p>
             <a:fld id="{2A7CB402-B72D-3346-9EA5-354251120F9E}" type="datetimeFigureOut">
               <a:rPr lang="en-US" smtClean="0"/>
-              <a:t>10/5/16</a:t>
+              <a:t>3/8/17</a:t>
             </a:fld>
             <a:endParaRPr lang="en-US"/>
           </a:p>
@@ -5124,6 +5125,84 @@
           <a:p>
             <a:r>
               <a:rPr lang="en-US" dirty="0" smtClean="0"/>
+              <a:t>Examples</a:t>
+            </a:r>
+            <a:endParaRPr lang="en-US" dirty="0"/>
+          </a:p>
+        </p:txBody>
+      </p:sp>
+      <p:sp>
+        <p:nvSpPr>
+          <p:cNvPr id="3" name="Content Placeholder 2"/>
+          <p:cNvSpPr>
+            <a:spLocks noGrp="1"/>
+          </p:cNvSpPr>
+          <p:nvPr>
+            <p:ph idx="1"/>
+          </p:nvPr>
+        </p:nvSpPr>
+        <p:spPr/>
+        <p:txBody>
+          <a:bodyPr/>
+          <a:lstStyle/>
+          <a:p>
+            <a:r>
+              <a:rPr lang="en-US" dirty="0" smtClean="0"/>
+              <a:t>Let's walkthrough some sample documentation</a:t>
+            </a:r>
+            <a:endParaRPr lang="en-US" dirty="0"/>
+          </a:p>
+        </p:txBody>
+      </p:sp>
+    </p:spTree>
+    <p:extLst>
+      <p:ext uri="{BB962C8B-B14F-4D97-AF65-F5344CB8AC3E}">
+        <p14:creationId xmlns:p14="http://schemas.microsoft.com/office/powerpoint/2010/main" val="453956232"/>
+      </p:ext>
+    </p:extLst>
+  </p:cSld>
+  <p:clrMapOvr>
+    <a:masterClrMapping/>
+  </p:clrMapOvr>
+</p:sld>
+</file>
+
+<file path=ppt/slides/slide15.xml><?xml version="1.0" encoding="utf-8"?>
+<p:sld xmlns:a="http://schemas.openxmlformats.org/drawingml/2006/main" xmlns:r="http://schemas.openxmlformats.org/officeDocument/2006/relationships" xmlns:p="http://schemas.openxmlformats.org/presentationml/2006/main">
+  <p:cSld>
+    <p:spTree>
+      <p:nvGrpSpPr>
+        <p:cNvPr id="1" name=""/>
+        <p:cNvGrpSpPr/>
+        <p:nvPr/>
+      </p:nvGrpSpPr>
+      <p:grpSpPr>
+        <a:xfrm>
+          <a:off x="0" y="0"/>
+          <a:ext cx="0" cy="0"/>
+          <a:chOff x="0" y="0"/>
+          <a:chExt cx="0" cy="0"/>
+        </a:xfrm>
+      </p:grpSpPr>
+      <p:sp>
+        <p:nvSpPr>
+          <p:cNvPr id="2" name="Title 1"/>
+          <p:cNvSpPr>
+            <a:spLocks noGrp="1"/>
+          </p:cNvSpPr>
+          <p:nvPr>
+            <p:ph type="title"/>
+          </p:nvPr>
+        </p:nvSpPr>
+        <p:spPr/>
+        <p:txBody>
+          <a:bodyPr>
+            <a:normAutofit fontScale="90000"/>
+          </a:bodyPr>
+          <a:lstStyle/>
+          <a:p>
+            <a:r>
+              <a:rPr lang="en-US" dirty="0" smtClean="0"/>
               <a:t>Questions</a:t>
             </a:r>
             <a:endParaRPr lang="en-US" dirty="0"/>
@@ -5156,11 +5235,7 @@
           <a:p>
             <a:r>
               <a:rPr lang="en-US" dirty="0" smtClean="0"/>
-              <a:t>Twitter: @</a:t>
-            </a:r>
-            <a:r>
-              <a:rPr lang="en-US" dirty="0" smtClean="0"/>
-              <a:t>jkwuc89</a:t>
+              <a:t>Twitter: @jkwuc89</a:t>
             </a:r>
           </a:p>
           <a:p>
@@ -5494,16 +5569,14 @@
         </p:nvSpPr>
         <p:spPr/>
         <p:txBody>
-          <a:bodyPr/>
+          <a:bodyPr>
+            <a:normAutofit fontScale="85000" lnSpcReduction="10000"/>
+          </a:bodyPr>
           <a:lstStyle/>
           <a:p>
             <a:r>
               <a:rPr lang="en-US" dirty="0" smtClean="0"/>
-              <a:t>27+ </a:t>
-            </a:r>
-            <a:r>
-              <a:rPr lang="en-US" dirty="0" smtClean="0"/>
-              <a:t>year career</a:t>
+              <a:t>27+ year career</a:t>
             </a:r>
           </a:p>
           <a:p>
@@ -5516,21 +5589,32 @@
             <a:pPr lvl="1"/>
             <a:r>
               <a:rPr lang="en-US" dirty="0" smtClean="0"/>
-              <a:t>IBM, Lexmark, Diebold, Limited Brands, Sterling Commerce, IBM (again), Leading EDJE, Improving</a:t>
-            </a:r>
-          </a:p>
-          <a:p>
-            <a:r>
-              <a:rPr lang="en-US" dirty="0" smtClean="0"/>
-              <a:t>Worked on several projects </a:t>
-            </a:r>
-            <a:r>
-              <a:rPr lang="en-US" dirty="0" smtClean="0"/>
-              <a:t>where there </a:t>
-            </a:r>
-            <a:r>
-              <a:rPr lang="en-US" dirty="0" smtClean="0"/>
-              <a:t>was insufficient documentation</a:t>
+              <a:t>IBM, Lexmark, Diebold, Limited Brands, Sterling Commerce, IBM (again), Leading EDJE, </a:t>
+            </a:r>
+            <a:r>
+              <a:rPr lang="en-US" dirty="0" smtClean="0"/>
+              <a:t>Crown Equipment Corp, Wendy's, Improving, Ohio State, Abercrombie &amp; Fitch</a:t>
+            </a:r>
+            <a:endParaRPr lang="en-US" dirty="0" smtClean="0"/>
+          </a:p>
+          <a:p>
+            <a:r>
+              <a:rPr lang="en-US" dirty="0" smtClean="0"/>
+              <a:t>Worked on several projects with effective documentation 😃</a:t>
+            </a:r>
+          </a:p>
+          <a:p>
+            <a:r>
+              <a:rPr lang="en-US" dirty="0" smtClean="0"/>
+              <a:t>Worked </a:t>
+            </a:r>
+            <a:r>
+              <a:rPr lang="en-US" dirty="0" smtClean="0"/>
+              <a:t>on several projects where there was </a:t>
+            </a:r>
+            <a:r>
+              <a:rPr lang="en-US" dirty="0" smtClean="0"/>
+              <a:t>little to no documentation 😢</a:t>
             </a:r>
             <a:endParaRPr lang="en-US" dirty="0" smtClean="0"/>
           </a:p>
@@ -5770,7 +5854,7 @@
         <p:spPr/>
         <p:txBody>
           <a:bodyPr>
-            <a:normAutofit/>
+            <a:normAutofit fontScale="92500" lnSpcReduction="10000"/>
           </a:bodyPr>
           <a:lstStyle/>
           <a:p>
@@ -5782,38 +5866,41 @@
           <a:p>
             <a:r>
               <a:rPr lang="en-US" dirty="0" smtClean="0"/>
-              <a:t>Keep current team members up to date with project changes</a:t>
-            </a:r>
-          </a:p>
-          <a:p>
-            <a:r>
-              <a:rPr lang="en-US" dirty="0" smtClean="0"/>
-              <a:t>Project review and verification</a:t>
-            </a:r>
-          </a:p>
-          <a:p>
-            <a:r>
-              <a:rPr lang="en-US" dirty="0" smtClean="0"/>
-              <a:t>Transition ongoing development and support to the </a:t>
-            </a:r>
-            <a:r>
-              <a:rPr lang="en-US" dirty="0" smtClean="0"/>
-              <a:t>client or to your </a:t>
-            </a:r>
-            <a:r>
-              <a:rPr lang="en-US" smtClean="0"/>
-              <a:t>support organization</a:t>
+              <a:t>Keep current team members up to date with project </a:t>
+            </a:r>
+            <a:r>
+              <a:rPr lang="en-US" dirty="0" smtClean="0"/>
+              <a:t>changes</a:t>
+            </a:r>
+          </a:p>
+          <a:p>
+            <a:r>
+              <a:rPr lang="en-US" dirty="0" smtClean="0"/>
+              <a:t>Project release cadence</a:t>
             </a:r>
             <a:endParaRPr lang="en-US" dirty="0" smtClean="0"/>
           </a:p>
           <a:p>
             <a:r>
               <a:rPr lang="en-US" dirty="0" smtClean="0"/>
-              <a:t>Documentation </a:t>
-            </a:r>
-            <a:r>
-              <a:rPr lang="en-US" dirty="0" smtClean="0"/>
-              <a:t>is part of your software deliverable</a:t>
+              <a:t>Project review and </a:t>
+            </a:r>
+            <a:r>
+              <a:rPr lang="en-US" dirty="0" smtClean="0"/>
+              <a:t>verification</a:t>
+            </a:r>
+            <a:endParaRPr lang="en-US" dirty="0" smtClean="0"/>
+          </a:p>
+          <a:p>
+            <a:r>
+              <a:rPr lang="en-US" dirty="0" smtClean="0"/>
+              <a:t>Transition ongoing development and support to the client or to your support organization</a:t>
+            </a:r>
+          </a:p>
+          <a:p>
+            <a:r>
+              <a:rPr lang="en-US" b="1" u="sng" dirty="0" smtClean="0"/>
+              <a:t>Documentation is part of your software deliverable</a:t>
             </a:r>
           </a:p>
           <a:p>
@@ -5896,7 +5983,7 @@
         <p:spPr/>
         <p:txBody>
           <a:bodyPr>
-            <a:normAutofit fontScale="85000" lnSpcReduction="20000"/>
+            <a:normAutofit fontScale="77500" lnSpcReduction="20000"/>
           </a:bodyPr>
           <a:lstStyle/>
           <a:p>
@@ -6009,15 +6096,34 @@
           <a:p>
             <a:r>
               <a:rPr lang="en-US" dirty="0" smtClean="0"/>
-              <a:t>Provide installation and access instructions for all </a:t>
-            </a:r>
-            <a:r>
-              <a:rPr lang="en-US" dirty="0" smtClean="0"/>
-              <a:t>software, servers and </a:t>
-            </a:r>
-            <a:r>
-              <a:rPr lang="en-US" dirty="0" smtClean="0"/>
-              <a:t>tools</a:t>
+              <a:t>Provide </a:t>
+            </a:r>
+            <a:r>
+              <a:rPr lang="en-US" b="1" u="sng" dirty="0" smtClean="0"/>
+              <a:t>working</a:t>
+            </a:r>
+            <a:r>
+              <a:rPr lang="en-US" dirty="0" smtClean="0"/>
+              <a:t> links for all online tools</a:t>
+            </a:r>
+            <a:endParaRPr lang="en-US" dirty="0" smtClean="0"/>
+          </a:p>
+          <a:p>
+            <a:r>
+              <a:rPr lang="en-US" dirty="0" smtClean="0"/>
+              <a:t>Provide </a:t>
+            </a:r>
+            <a:r>
+              <a:rPr lang="en-US" dirty="0" smtClean="0"/>
+              <a:t>installation and access instructions for all software, </a:t>
+            </a:r>
+            <a:r>
+              <a:rPr lang="en-US" dirty="0" smtClean="0"/>
+              <a:t>servers, databases </a:t>
+            </a:r>
+            <a:r>
+              <a:rPr lang="en-US" dirty="0" smtClean="0"/>
+              <a:t>and tools</a:t>
             </a:r>
           </a:p>
           <a:p>
@@ -6126,15 +6232,36 @@
             <a:pPr lvl="1"/>
             <a:r>
               <a:rPr lang="en-US" dirty="0" smtClean="0"/>
-              <a:t>Include project owner/sponsor, PMs, BAs, developers, QA, IT support</a:t>
+              <a:t>Include project owner/sponsor, PMs, </a:t>
+            </a:r>
+            <a:r>
+              <a:rPr lang="en-US" dirty="0" smtClean="0"/>
+              <a:t>Scrum Masters, BAs</a:t>
+            </a:r>
+            <a:r>
+              <a:rPr lang="en-US" dirty="0" smtClean="0"/>
+              <a:t>, </a:t>
+            </a:r>
+            <a:r>
+              <a:rPr lang="en-US" dirty="0" smtClean="0"/>
+              <a:t>Developers</a:t>
+            </a:r>
+            <a:r>
+              <a:rPr lang="en-US" dirty="0" smtClean="0"/>
+              <a:t>, QA, IT support</a:t>
             </a:r>
           </a:p>
           <a:p>
             <a:pPr lvl="1"/>
             <a:r>
               <a:rPr lang="en-US" dirty="0" smtClean="0"/>
-              <a:t>Include email and phone numbers</a:t>
-            </a:r>
+              <a:t>Include </a:t>
+            </a:r>
+            <a:r>
+              <a:rPr lang="en-US" dirty="0" smtClean="0"/>
+              <a:t>email, phone numbers, desk locations</a:t>
+            </a:r>
+            <a:endParaRPr lang="en-US" dirty="0" smtClean="0"/>
           </a:p>
           <a:p>
             <a:r>
@@ -6155,7 +6282,11 @@
           <a:p>
             <a:r>
               <a:rPr lang="en-US" dirty="0" smtClean="0"/>
-              <a:t>Project management/issue tracking software/tools</a:t>
+              <a:t>Project management/issue tracking </a:t>
+            </a:r>
+            <a:r>
+              <a:rPr lang="en-US" dirty="0" smtClean="0"/>
+              <a:t>software/tools</a:t>
             </a:r>
           </a:p>
         </p:txBody>
@@ -6460,11 +6591,7 @@
             </a:r>
             <a:r>
               <a:rPr lang="en-US" dirty="0" smtClean="0"/>
-              <a:t>used</a:t>
-            </a:r>
-            <a:r>
-              <a:rPr lang="en-US" dirty="0" smtClean="0"/>
-              <a:t>?</a:t>
+              <a:t>used?</a:t>
             </a:r>
           </a:p>
           <a:p>
@@ -6472,7 +6599,6 @@
               <a:rPr lang="en-US" dirty="0" smtClean="0"/>
               <a:t>What continuous integration is being used?</a:t>
             </a:r>
-            <a:endParaRPr lang="en-US" dirty="0" smtClean="0"/>
           </a:p>
         </p:txBody>
       </p:sp>

</xml_diff>